<commit_message>
Slight modify function .mlx
</commit_message>
<xml_diff>
--- a/Week2/Functions_ControlFlow_2021.pptx
+++ b/Week2/Functions_ControlFlow_2021.pptx
@@ -5,7 +5,7 @@
     <p:sldMasterId id="2147483648" r:id="rId1"/>
   </p:sldMasterIdLst>
   <p:notesMasterIdLst>
-    <p:notesMasterId r:id="rId29"/>
+    <p:notesMasterId r:id="rId28"/>
   </p:notesMasterIdLst>
   <p:sldIdLst>
     <p:sldId id="256" r:id="rId2"/>
@@ -34,7 +34,6 @@
     <p:sldId id="279" r:id="rId25"/>
     <p:sldId id="280" r:id="rId26"/>
     <p:sldId id="287" r:id="rId27"/>
-    <p:sldId id="274" r:id="rId28"/>
   </p:sldIdLst>
   <p:sldSz cx="12192000" cy="6858000"/>
   <p:notesSz cx="6858000" cy="9144000"/>
@@ -141,6 +140,42 @@
 </p:presentation>
 </file>
 
+<file path=ppt/changesInfos/changesInfo1.xml><?xml version="1.0" encoding="utf-8"?>
+<pc:chgInfo xmlns:a="http://schemas.openxmlformats.org/drawingml/2006/main" xmlns:r="http://schemas.openxmlformats.org/officeDocument/2006/relationships" xmlns:ac="http://schemas.microsoft.com/office/drawing/2013/main/command" xmlns:pc="http://schemas.microsoft.com/office/powerpoint/2013/main/command">
+  <pc:docChgLst>
+    <pc:chgData name="John Thompson" userId="9365514347fba710" providerId="LiveId" clId="{0D8B74B9-BD38-4585-81B4-AC407C507EF3}"/>
+    <pc:docChg chg="delSld modSld">
+      <pc:chgData name="John Thompson" userId="9365514347fba710" providerId="LiveId" clId="{0D8B74B9-BD38-4585-81B4-AC407C507EF3}" dt="2023-06-18T20:59:18.985" v="6" actId="47"/>
+      <pc:docMkLst>
+        <pc:docMk/>
+      </pc:docMkLst>
+      <pc:sldChg chg="modSp mod">
+        <pc:chgData name="John Thompson" userId="9365514347fba710" providerId="LiveId" clId="{0D8B74B9-BD38-4585-81B4-AC407C507EF3}" dt="2023-06-18T20:58:43.067" v="5" actId="20577"/>
+        <pc:sldMkLst>
+          <pc:docMk/>
+          <pc:sldMk cId="2235012780" sldId="256"/>
+        </pc:sldMkLst>
+        <pc:spChg chg="mod">
+          <ac:chgData name="John Thompson" userId="9365514347fba710" providerId="LiveId" clId="{0D8B74B9-BD38-4585-81B4-AC407C507EF3}" dt="2023-06-18T20:58:43.067" v="5" actId="20577"/>
+          <ac:spMkLst>
+            <pc:docMk/>
+            <pc:sldMk cId="2235012780" sldId="256"/>
+            <ac:spMk id="3" creationId="{00000000-0000-0000-0000-000000000000}"/>
+          </ac:spMkLst>
+        </pc:spChg>
+      </pc:sldChg>
+      <pc:sldChg chg="del">
+        <pc:chgData name="John Thompson" userId="9365514347fba710" providerId="LiveId" clId="{0D8B74B9-BD38-4585-81B4-AC407C507EF3}" dt="2023-06-18T20:59:18.985" v="6" actId="47"/>
+        <pc:sldMkLst>
+          <pc:docMk/>
+          <pc:sldMk cId="1027562305" sldId="274"/>
+        </pc:sldMkLst>
+      </pc:sldChg>
+    </pc:docChg>
+  </pc:docChgLst>
+</pc:chgInfo>
+</file>
+
 <file path=ppt/notesMasters/notesMaster1.xml><?xml version="1.0" encoding="utf-8"?>
 <p:notesMaster xmlns:a="http://schemas.openxmlformats.org/drawingml/2006/main" xmlns:r="http://schemas.openxmlformats.org/officeDocument/2006/relationships" xmlns:p="http://schemas.openxmlformats.org/presentationml/2006/main">
   <p:cSld>
@@ -223,7 +258,7 @@
           <a:p>
             <a:fld id="{E906A1D5-1054-4AB1-8DE5-3497DBA7A31B}" type="datetimeFigureOut">
               <a:rPr lang="en-US" smtClean="0"/>
-              <a:t>6/18/2021</a:t>
+              <a:t>6/18/2023</a:t>
             </a:fld>
             <a:endParaRPr lang="en-US"/>
           </a:p>
@@ -703,7 +738,7 @@
           <a:p>
             <a:fld id="{F7B30EC0-B12C-45B4-A43C-1997A822F6C8}" type="datetimeFigureOut">
               <a:rPr lang="en-US" smtClean="0"/>
-              <a:t>6/18/2021</a:t>
+              <a:t>6/18/2023</a:t>
             </a:fld>
             <a:endParaRPr lang="en-US"/>
           </a:p>
@@ -871,7 +906,7 @@
           <a:p>
             <a:fld id="{F7B30EC0-B12C-45B4-A43C-1997A822F6C8}" type="datetimeFigureOut">
               <a:rPr lang="en-US" smtClean="0"/>
-              <a:t>6/18/2021</a:t>
+              <a:t>6/18/2023</a:t>
             </a:fld>
             <a:endParaRPr lang="en-US"/>
           </a:p>
@@ -1049,7 +1084,7 @@
           <a:p>
             <a:fld id="{F7B30EC0-B12C-45B4-A43C-1997A822F6C8}" type="datetimeFigureOut">
               <a:rPr lang="en-US" smtClean="0"/>
-              <a:t>6/18/2021</a:t>
+              <a:t>6/18/2023</a:t>
             </a:fld>
             <a:endParaRPr lang="en-US"/>
           </a:p>
@@ -1217,7 +1252,7 @@
           <a:p>
             <a:fld id="{F7B30EC0-B12C-45B4-A43C-1997A822F6C8}" type="datetimeFigureOut">
               <a:rPr lang="en-US" smtClean="0"/>
-              <a:t>6/18/2021</a:t>
+              <a:t>6/18/2023</a:t>
             </a:fld>
             <a:endParaRPr lang="en-US"/>
           </a:p>
@@ -1462,7 +1497,7 @@
           <a:p>
             <a:fld id="{F7B30EC0-B12C-45B4-A43C-1997A822F6C8}" type="datetimeFigureOut">
               <a:rPr lang="en-US" smtClean="0"/>
-              <a:t>6/18/2021</a:t>
+              <a:t>6/18/2023</a:t>
             </a:fld>
             <a:endParaRPr lang="en-US"/>
           </a:p>
@@ -1691,7 +1726,7 @@
           <a:p>
             <a:fld id="{F7B30EC0-B12C-45B4-A43C-1997A822F6C8}" type="datetimeFigureOut">
               <a:rPr lang="en-US" smtClean="0"/>
-              <a:t>6/18/2021</a:t>
+              <a:t>6/18/2023</a:t>
             </a:fld>
             <a:endParaRPr lang="en-US"/>
           </a:p>
@@ -2055,7 +2090,7 @@
           <a:p>
             <a:fld id="{F7B30EC0-B12C-45B4-A43C-1997A822F6C8}" type="datetimeFigureOut">
               <a:rPr lang="en-US" smtClean="0"/>
-              <a:t>6/18/2021</a:t>
+              <a:t>6/18/2023</a:t>
             </a:fld>
             <a:endParaRPr lang="en-US"/>
           </a:p>
@@ -2172,7 +2207,7 @@
           <a:p>
             <a:fld id="{F7B30EC0-B12C-45B4-A43C-1997A822F6C8}" type="datetimeFigureOut">
               <a:rPr lang="en-US" smtClean="0"/>
-              <a:t>6/18/2021</a:t>
+              <a:t>6/18/2023</a:t>
             </a:fld>
             <a:endParaRPr lang="en-US"/>
           </a:p>
@@ -2267,7 +2302,7 @@
           <a:p>
             <a:fld id="{F7B30EC0-B12C-45B4-A43C-1997A822F6C8}" type="datetimeFigureOut">
               <a:rPr lang="en-US" smtClean="0"/>
-              <a:t>6/18/2021</a:t>
+              <a:t>6/18/2023</a:t>
             </a:fld>
             <a:endParaRPr lang="en-US"/>
           </a:p>
@@ -2542,7 +2577,7 @@
           <a:p>
             <a:fld id="{F7B30EC0-B12C-45B4-A43C-1997A822F6C8}" type="datetimeFigureOut">
               <a:rPr lang="en-US" smtClean="0"/>
-              <a:t>6/18/2021</a:t>
+              <a:t>6/18/2023</a:t>
             </a:fld>
             <a:endParaRPr lang="en-US"/>
           </a:p>
@@ -2794,7 +2829,7 @@
           <a:p>
             <a:fld id="{F7B30EC0-B12C-45B4-A43C-1997A822F6C8}" type="datetimeFigureOut">
               <a:rPr lang="en-US" smtClean="0"/>
-              <a:t>6/18/2021</a:t>
+              <a:t>6/18/2023</a:t>
             </a:fld>
             <a:endParaRPr lang="en-US"/>
           </a:p>
@@ -3005,7 +3040,7 @@
           <a:p>
             <a:fld id="{F7B30EC0-B12C-45B4-A43C-1997A822F6C8}" type="datetimeFigureOut">
               <a:rPr lang="en-US" smtClean="0"/>
-              <a:t>6/18/2021</a:t>
+              <a:t>6/18/2023</a:t>
             </a:fld>
             <a:endParaRPr lang="en-US"/>
           </a:p>
@@ -3466,7 +3501,7 @@
           <a:p>
             <a:r>
               <a:rPr lang="en-US" dirty="0"/>
-              <a:t>June 26, 2018</a:t>
+              <a:t>June 19, 2023</a:t>
             </a:r>
           </a:p>
         </p:txBody>
@@ -19247,157 +19282,6 @@
 </p:sld>
 </file>
 
-<file path=ppt/slides/slide27.xml><?xml version="1.0" encoding="utf-8"?>
-<p:sld xmlns:a="http://schemas.openxmlformats.org/drawingml/2006/main" xmlns:r="http://schemas.openxmlformats.org/officeDocument/2006/relationships" xmlns:p="http://schemas.openxmlformats.org/presentationml/2006/main">
-  <p:cSld>
-    <p:spTree>
-      <p:nvGrpSpPr>
-        <p:cNvPr id="1" name=""/>
-        <p:cNvGrpSpPr/>
-        <p:nvPr/>
-      </p:nvGrpSpPr>
-      <p:grpSpPr>
-        <a:xfrm>
-          <a:off x="0" y="0"/>
-          <a:ext cx="0" cy="0"/>
-          <a:chOff x="0" y="0"/>
-          <a:chExt cx="0" cy="0"/>
-        </a:xfrm>
-      </p:grpSpPr>
-      <p:sp>
-        <p:nvSpPr>
-          <p:cNvPr id="4" name="TextBox 3"/>
-          <p:cNvSpPr txBox="1"/>
-          <p:nvPr/>
-        </p:nvSpPr>
-        <p:spPr>
-          <a:xfrm>
-            <a:off x="3683579" y="421608"/>
-            <a:ext cx="4070410" cy="1107996"/>
-          </a:xfrm>
-          <a:prstGeom prst="rect">
-            <a:avLst/>
-          </a:prstGeom>
-          <a:noFill/>
-        </p:spPr>
-        <p:txBody>
-          <a:bodyPr wrap="none" rtlCol="0">
-            <a:spAutoFit/>
-          </a:bodyPr>
-          <a:lstStyle/>
-          <a:p>
-            <a:r>
-              <a:rPr lang="en-US" sz="6600" b="1" dirty="0">
-                <a:effectLst>
-                  <a:outerShdw blurRad="38100" dist="38100" dir="2700000" algn="tl">
-                    <a:srgbClr val="000000">
-                      <a:alpha val="43137"/>
-                    </a:srgbClr>
-                  </a:outerShdw>
-                </a:effectLst>
-              </a:rPr>
-              <a:t>Homework</a:t>
-            </a:r>
-          </a:p>
-        </p:txBody>
-      </p:sp>
-      <p:sp>
-        <p:nvSpPr>
-          <p:cNvPr id="5" name="Rectangle 4"/>
-          <p:cNvSpPr/>
-          <p:nvPr/>
-        </p:nvSpPr>
-        <p:spPr>
-          <a:xfrm>
-            <a:off x="3267116" y="2351782"/>
-            <a:ext cx="5409045" cy="1077218"/>
-          </a:xfrm>
-          <a:prstGeom prst="rect">
-            <a:avLst/>
-          </a:prstGeom>
-        </p:spPr>
-        <p:txBody>
-          <a:bodyPr wrap="none">
-            <a:spAutoFit/>
-          </a:bodyPr>
-          <a:lstStyle/>
-          <a:p>
-            <a:pPr marL="742950" indent="-742950">
-              <a:buAutoNum type="arabicPeriod"/>
-            </a:pPr>
-            <a:r>
-              <a:rPr lang="en-US" sz="3200" b="1" dirty="0"/>
-              <a:t>Control Flow (6 questions)</a:t>
-            </a:r>
-            <a:endParaRPr lang="en-US" sz="3200" b="1" dirty="0">
-              <a:cs typeface="Courier New" panose="02070309020205020404" pitchFamily="49" charset="0"/>
-            </a:endParaRPr>
-          </a:p>
-          <a:p>
-            <a:pPr marL="742950" indent="-742950">
-              <a:buAutoNum type="arabicPeriod"/>
-            </a:pPr>
-            <a:r>
-              <a:rPr lang="en-US" sz="3200" b="1" dirty="0">
-                <a:cs typeface="Courier New" panose="02070309020205020404" pitchFamily="49" charset="0"/>
-              </a:rPr>
-              <a:t>Functions (1 question)</a:t>
-            </a:r>
-          </a:p>
-        </p:txBody>
-      </p:sp>
-      <p:sp>
-        <p:nvSpPr>
-          <p:cNvPr id="6" name="Rectangle 5">
-            <a:extLst>
-              <a:ext uri="{FF2B5EF4-FFF2-40B4-BE49-F238E27FC236}">
-                <a16:creationId xmlns:a16="http://schemas.microsoft.com/office/drawing/2014/main" id="{D0426664-F666-4864-ADE3-09EFCFA47A10}"/>
-              </a:ext>
-            </a:extLst>
-          </p:cNvPr>
-          <p:cNvSpPr/>
-          <p:nvPr/>
-        </p:nvSpPr>
-        <p:spPr>
-          <a:xfrm>
-            <a:off x="1272939" y="4333300"/>
-            <a:ext cx="10073270" cy="923330"/>
-          </a:xfrm>
-          <a:prstGeom prst="rect">
-            <a:avLst/>
-          </a:prstGeom>
-        </p:spPr>
-        <p:txBody>
-          <a:bodyPr wrap="none">
-            <a:spAutoFit/>
-          </a:bodyPr>
-          <a:lstStyle/>
-          <a:p>
-            <a:r>
-              <a:rPr lang="en-US" sz="5400" b="1" dirty="0">
-                <a:solidFill>
-                  <a:srgbClr val="FF0000"/>
-                </a:solidFill>
-                <a:cs typeface="Courier New" panose="02070309020205020404" pitchFamily="49" charset="0"/>
-              </a:rPr>
-              <a:t>Don’t hesitate to email for help!!!!</a:t>
-            </a:r>
-          </a:p>
-        </p:txBody>
-      </p:sp>
-    </p:spTree>
-    <p:extLst>
-      <p:ext uri="{BB962C8B-B14F-4D97-AF65-F5344CB8AC3E}">
-        <p14:creationId xmlns:p14="http://schemas.microsoft.com/office/powerpoint/2010/main" val="1027562305"/>
-      </p:ext>
-    </p:extLst>
-  </p:cSld>
-  <p:clrMapOvr>
-    <a:masterClrMapping/>
-  </p:clrMapOvr>
-</p:sld>
-</file>
-
 <file path=ppt/slides/slide3.xml><?xml version="1.0" encoding="utf-8"?>
 <p:sld xmlns:a="http://schemas.openxmlformats.org/drawingml/2006/main" xmlns:r="http://schemas.openxmlformats.org/officeDocument/2006/relationships" xmlns:p="http://schemas.openxmlformats.org/presentationml/2006/main">
   <p:cSld>

</xml_diff>